<commit_message>
Complete 2 out 5 topic of the CSS modules, can transition transition transformation background box model etc.
</commit_message>
<xml_diff>
--- a/TheWebDeveloperBootcamp2022/crucialImportantGoodToKnowTopics.docx.pptx
+++ b/TheWebDeveloperBootcamp2022/crucialImportantGoodToKnowTopics.docx.pptx
@@ -7,6 +7,10 @@
   <p:sldIdLst>
     <p:sldId id="256" r:id="rId2"/>
     <p:sldId id="257" r:id="rId3"/>
+    <p:sldId id="258" r:id="rId4"/>
+    <p:sldId id="259" r:id="rId5"/>
+    <p:sldId id="260" r:id="rId6"/>
+    <p:sldId id="261" r:id="rId7"/>
   </p:sldIdLst>
   <p:sldSz cx="12192000" cy="6858000"/>
   <p:notesSz cx="6858000" cy="9144000"/>
@@ -105,6 +109,11 @@
       </a:defRPr>
     </a:lvl9pPr>
   </p:defaultTextStyle>
+  <p:extLst>
+    <p:ext uri="{EFAFB233-063F-42B5-8137-9DF3F51BA10A}">
+      <p15:sldGuideLst xmlns:p15="http://schemas.microsoft.com/office/powerpoint/2012/main"/>
+    </p:ext>
+  </p:extLst>
 </p:presentation>
 </file>
 
@@ -257,7 +266,7 @@
           <a:p>
             <a:fld id="{74A9CC92-CEC6-4267-ACE7-2A54D9A3B516}" type="datetimeFigureOut">
               <a:rPr lang="en-GB" smtClean="0"/>
-              <a:t>14/01/2022</a:t>
+              <a:t>16/01/2022</a:t>
             </a:fld>
             <a:endParaRPr lang="en-GB"/>
           </a:p>
@@ -457,7 +466,7 @@
           <a:p>
             <a:fld id="{74A9CC92-CEC6-4267-ACE7-2A54D9A3B516}" type="datetimeFigureOut">
               <a:rPr lang="en-GB" smtClean="0"/>
-              <a:t>14/01/2022</a:t>
+              <a:t>16/01/2022</a:t>
             </a:fld>
             <a:endParaRPr lang="en-GB"/>
           </a:p>
@@ -667,7 +676,7 @@
           <a:p>
             <a:fld id="{74A9CC92-CEC6-4267-ACE7-2A54D9A3B516}" type="datetimeFigureOut">
               <a:rPr lang="en-GB" smtClean="0"/>
-              <a:t>14/01/2022</a:t>
+              <a:t>16/01/2022</a:t>
             </a:fld>
             <a:endParaRPr lang="en-GB"/>
           </a:p>
@@ -867,7 +876,7 @@
           <a:p>
             <a:fld id="{74A9CC92-CEC6-4267-ACE7-2A54D9A3B516}" type="datetimeFigureOut">
               <a:rPr lang="en-GB" smtClean="0"/>
-              <a:t>14/01/2022</a:t>
+              <a:t>16/01/2022</a:t>
             </a:fld>
             <a:endParaRPr lang="en-GB"/>
           </a:p>
@@ -1143,7 +1152,7 @@
           <a:p>
             <a:fld id="{74A9CC92-CEC6-4267-ACE7-2A54D9A3B516}" type="datetimeFigureOut">
               <a:rPr lang="en-GB" smtClean="0"/>
-              <a:t>14/01/2022</a:t>
+              <a:t>16/01/2022</a:t>
             </a:fld>
             <a:endParaRPr lang="en-GB"/>
           </a:p>
@@ -1411,7 +1420,7 @@
           <a:p>
             <a:fld id="{74A9CC92-CEC6-4267-ACE7-2A54D9A3B516}" type="datetimeFigureOut">
               <a:rPr lang="en-GB" smtClean="0"/>
-              <a:t>14/01/2022</a:t>
+              <a:t>16/01/2022</a:t>
             </a:fld>
             <a:endParaRPr lang="en-GB"/>
           </a:p>
@@ -1826,7 +1835,7 @@
           <a:p>
             <a:fld id="{74A9CC92-CEC6-4267-ACE7-2A54D9A3B516}" type="datetimeFigureOut">
               <a:rPr lang="en-GB" smtClean="0"/>
-              <a:t>14/01/2022</a:t>
+              <a:t>16/01/2022</a:t>
             </a:fld>
             <a:endParaRPr lang="en-GB"/>
           </a:p>
@@ -1968,7 +1977,7 @@
           <a:p>
             <a:fld id="{74A9CC92-CEC6-4267-ACE7-2A54D9A3B516}" type="datetimeFigureOut">
               <a:rPr lang="en-GB" smtClean="0"/>
-              <a:t>14/01/2022</a:t>
+              <a:t>16/01/2022</a:t>
             </a:fld>
             <a:endParaRPr lang="en-GB"/>
           </a:p>
@@ -2081,7 +2090,7 @@
           <a:p>
             <a:fld id="{74A9CC92-CEC6-4267-ACE7-2A54D9A3B516}" type="datetimeFigureOut">
               <a:rPr lang="en-GB" smtClean="0"/>
-              <a:t>14/01/2022</a:t>
+              <a:t>16/01/2022</a:t>
             </a:fld>
             <a:endParaRPr lang="en-GB"/>
           </a:p>
@@ -2394,7 +2403,7 @@
           <a:p>
             <a:fld id="{74A9CC92-CEC6-4267-ACE7-2A54D9A3B516}" type="datetimeFigureOut">
               <a:rPr lang="en-GB" smtClean="0"/>
-              <a:t>14/01/2022</a:t>
+              <a:t>16/01/2022</a:t>
             </a:fld>
             <a:endParaRPr lang="en-GB"/>
           </a:p>
@@ -2683,7 +2692,7 @@
           <a:p>
             <a:fld id="{74A9CC92-CEC6-4267-ACE7-2A54D9A3B516}" type="datetimeFigureOut">
               <a:rPr lang="en-GB" smtClean="0"/>
-              <a:t>14/01/2022</a:t>
+              <a:t>16/01/2022</a:t>
             </a:fld>
             <a:endParaRPr lang="en-GB"/>
           </a:p>
@@ -2926,7 +2935,7 @@
           <a:p>
             <a:fld id="{74A9CC92-CEC6-4267-ACE7-2A54D9A3B516}" type="datetimeFigureOut">
               <a:rPr lang="en-GB" smtClean="0"/>
-              <a:t>14/01/2022</a:t>
+              <a:t>16/01/2022</a:t>
             </a:fld>
             <a:endParaRPr lang="en-GB"/>
           </a:p>
@@ -3503,6 +3512,476 @@
 </p:sld>
 </file>
 
+<file path=ppt/slides/slide3.xml><?xml version="1.0" encoding="utf-8"?>
+<p:sld xmlns:a="http://schemas.openxmlformats.org/drawingml/2006/main" xmlns:r="http://schemas.openxmlformats.org/officeDocument/2006/relationships" xmlns:p="http://schemas.openxmlformats.org/presentationml/2006/main">
+  <p:cSld>
+    <p:spTree>
+      <p:nvGrpSpPr>
+        <p:cNvPr id="1" name=""/>
+        <p:cNvGrpSpPr/>
+        <p:nvPr/>
+      </p:nvGrpSpPr>
+      <p:grpSpPr>
+        <a:xfrm>
+          <a:off x="0" y="0"/>
+          <a:ext cx="0" cy="0"/>
+          <a:chOff x="0" y="0"/>
+          <a:chExt cx="0" cy="0"/>
+        </a:xfrm>
+      </p:grpSpPr>
+      <p:sp>
+        <p:nvSpPr>
+          <p:cNvPr id="2" name="Title 1">
+            <a:extLst>
+              <a:ext uri="{FF2B5EF4-FFF2-40B4-BE49-F238E27FC236}">
+                <a16:creationId xmlns:a16="http://schemas.microsoft.com/office/drawing/2014/main" id="{742ED4C7-68F3-4707-96BC-EFA55B4E89F6}"/>
+              </a:ext>
+            </a:extLst>
+          </p:cNvPr>
+          <p:cNvSpPr>
+            <a:spLocks noGrp="1"/>
+          </p:cNvSpPr>
+          <p:nvPr>
+            <p:ph type="title"/>
+          </p:nvPr>
+        </p:nvSpPr>
+        <p:spPr/>
+        <p:txBody>
+          <a:bodyPr/>
+          <a:lstStyle/>
+          <a:p>
+            <a:endParaRPr lang="en-GB"/>
+          </a:p>
+        </p:txBody>
+      </p:sp>
+      <p:sp>
+        <p:nvSpPr>
+          <p:cNvPr id="3" name="Content Placeholder 2">
+            <a:extLst>
+              <a:ext uri="{FF2B5EF4-FFF2-40B4-BE49-F238E27FC236}">
+                <a16:creationId xmlns:a16="http://schemas.microsoft.com/office/drawing/2014/main" id="{3351DFE0-84F1-4822-AA5B-F21908486103}"/>
+              </a:ext>
+            </a:extLst>
+          </p:cNvPr>
+          <p:cNvSpPr>
+            <a:spLocks noGrp="1"/>
+          </p:cNvSpPr>
+          <p:nvPr>
+            <p:ph idx="1"/>
+          </p:nvPr>
+        </p:nvSpPr>
+        <p:spPr/>
+        <p:txBody>
+          <a:bodyPr/>
+          <a:lstStyle/>
+          <a:p>
+            <a:endParaRPr lang="en-GB"/>
+          </a:p>
+        </p:txBody>
+      </p:sp>
+      <p:pic>
+        <p:nvPicPr>
+          <p:cNvPr id="5" name="Picture 4">
+            <a:extLst>
+              <a:ext uri="{FF2B5EF4-FFF2-40B4-BE49-F238E27FC236}">
+                <a16:creationId xmlns:a16="http://schemas.microsoft.com/office/drawing/2014/main" id="{F09B6BDA-D519-4F23-BAF3-97FF0AC01803}"/>
+              </a:ext>
+            </a:extLst>
+          </p:cNvPr>
+          <p:cNvPicPr>
+            <a:picLocks noChangeAspect="1"/>
+          </p:cNvPicPr>
+          <p:nvPr/>
+        </p:nvPicPr>
+        <p:blipFill>
+          <a:blip r:embed="rId2"/>
+          <a:stretch>
+            <a:fillRect/>
+          </a:stretch>
+        </p:blipFill>
+        <p:spPr>
+          <a:xfrm>
+            <a:off x="0" y="0"/>
+            <a:ext cx="12192000" cy="6858000"/>
+          </a:xfrm>
+          <a:prstGeom prst="rect">
+            <a:avLst/>
+          </a:prstGeom>
+        </p:spPr>
+      </p:pic>
+    </p:spTree>
+    <p:extLst>
+      <p:ext uri="{BB962C8B-B14F-4D97-AF65-F5344CB8AC3E}">
+        <p14:creationId xmlns:p14="http://schemas.microsoft.com/office/powerpoint/2010/main" val="3754045668"/>
+      </p:ext>
+    </p:extLst>
+  </p:cSld>
+  <p:clrMapOvr>
+    <a:masterClrMapping/>
+  </p:clrMapOvr>
+</p:sld>
+</file>
+
+<file path=ppt/slides/slide4.xml><?xml version="1.0" encoding="utf-8"?>
+<p:sld xmlns:a="http://schemas.openxmlformats.org/drawingml/2006/main" xmlns:r="http://schemas.openxmlformats.org/officeDocument/2006/relationships" xmlns:p="http://schemas.openxmlformats.org/presentationml/2006/main">
+  <p:cSld>
+    <p:spTree>
+      <p:nvGrpSpPr>
+        <p:cNvPr id="1" name=""/>
+        <p:cNvGrpSpPr/>
+        <p:nvPr/>
+      </p:nvGrpSpPr>
+      <p:grpSpPr>
+        <a:xfrm>
+          <a:off x="0" y="0"/>
+          <a:ext cx="0" cy="0"/>
+          <a:chOff x="0" y="0"/>
+          <a:chExt cx="0" cy="0"/>
+        </a:xfrm>
+      </p:grpSpPr>
+      <p:sp>
+        <p:nvSpPr>
+          <p:cNvPr id="2" name="Title 1">
+            <a:extLst>
+              <a:ext uri="{FF2B5EF4-FFF2-40B4-BE49-F238E27FC236}">
+                <a16:creationId xmlns:a16="http://schemas.microsoft.com/office/drawing/2014/main" id="{0A16B292-7C1E-492C-8DBF-0C2418FB51C9}"/>
+              </a:ext>
+            </a:extLst>
+          </p:cNvPr>
+          <p:cNvSpPr>
+            <a:spLocks noGrp="1"/>
+          </p:cNvSpPr>
+          <p:nvPr>
+            <p:ph type="title"/>
+          </p:nvPr>
+        </p:nvSpPr>
+        <p:spPr/>
+        <p:txBody>
+          <a:bodyPr/>
+          <a:lstStyle/>
+          <a:p>
+            <a:endParaRPr lang="en-GB"/>
+          </a:p>
+        </p:txBody>
+      </p:sp>
+      <p:sp>
+        <p:nvSpPr>
+          <p:cNvPr id="3" name="Content Placeholder 2">
+            <a:extLst>
+              <a:ext uri="{FF2B5EF4-FFF2-40B4-BE49-F238E27FC236}">
+                <a16:creationId xmlns:a16="http://schemas.microsoft.com/office/drawing/2014/main" id="{643D3980-A40B-43CD-86F4-1AF7F441F0F5}"/>
+              </a:ext>
+            </a:extLst>
+          </p:cNvPr>
+          <p:cNvSpPr>
+            <a:spLocks noGrp="1"/>
+          </p:cNvSpPr>
+          <p:nvPr>
+            <p:ph idx="1"/>
+          </p:nvPr>
+        </p:nvSpPr>
+        <p:spPr/>
+        <p:txBody>
+          <a:bodyPr/>
+          <a:lstStyle/>
+          <a:p>
+            <a:endParaRPr lang="en-GB"/>
+          </a:p>
+        </p:txBody>
+      </p:sp>
+      <p:pic>
+        <p:nvPicPr>
+          <p:cNvPr id="5" name="Picture 4">
+            <a:extLst>
+              <a:ext uri="{FF2B5EF4-FFF2-40B4-BE49-F238E27FC236}">
+                <a16:creationId xmlns:a16="http://schemas.microsoft.com/office/drawing/2014/main" id="{ACC85B7F-60B3-44E4-B909-3F72A53B93EB}"/>
+              </a:ext>
+            </a:extLst>
+          </p:cNvPr>
+          <p:cNvPicPr>
+            <a:picLocks noChangeAspect="1"/>
+          </p:cNvPicPr>
+          <p:nvPr/>
+        </p:nvPicPr>
+        <p:blipFill>
+          <a:blip r:embed="rId2"/>
+          <a:stretch>
+            <a:fillRect/>
+          </a:stretch>
+        </p:blipFill>
+        <p:spPr>
+          <a:xfrm>
+            <a:off x="0" y="0"/>
+            <a:ext cx="12192000" cy="6858000"/>
+          </a:xfrm>
+          <a:prstGeom prst="rect">
+            <a:avLst/>
+          </a:prstGeom>
+        </p:spPr>
+      </p:pic>
+    </p:spTree>
+    <p:extLst>
+      <p:ext uri="{BB962C8B-B14F-4D97-AF65-F5344CB8AC3E}">
+        <p14:creationId xmlns:p14="http://schemas.microsoft.com/office/powerpoint/2010/main" val="391999833"/>
+      </p:ext>
+    </p:extLst>
+  </p:cSld>
+  <p:clrMapOvr>
+    <a:masterClrMapping/>
+  </p:clrMapOvr>
+</p:sld>
+</file>
+
+<file path=ppt/slides/slide5.xml><?xml version="1.0" encoding="utf-8"?>
+<p:sld xmlns:a="http://schemas.openxmlformats.org/drawingml/2006/main" xmlns:r="http://schemas.openxmlformats.org/officeDocument/2006/relationships" xmlns:p="http://schemas.openxmlformats.org/presentationml/2006/main">
+  <p:cSld>
+    <p:spTree>
+      <p:nvGrpSpPr>
+        <p:cNvPr id="1" name=""/>
+        <p:cNvGrpSpPr/>
+        <p:nvPr/>
+      </p:nvGrpSpPr>
+      <p:grpSpPr>
+        <a:xfrm>
+          <a:off x="0" y="0"/>
+          <a:ext cx="0" cy="0"/>
+          <a:chOff x="0" y="0"/>
+          <a:chExt cx="0" cy="0"/>
+        </a:xfrm>
+      </p:grpSpPr>
+      <p:sp>
+        <p:nvSpPr>
+          <p:cNvPr id="2" name="Title 1">
+            <a:extLst>
+              <a:ext uri="{FF2B5EF4-FFF2-40B4-BE49-F238E27FC236}">
+                <a16:creationId xmlns:a16="http://schemas.microsoft.com/office/drawing/2014/main" id="{BE263D71-EE49-4D23-B32F-C0943A0D78A8}"/>
+              </a:ext>
+            </a:extLst>
+          </p:cNvPr>
+          <p:cNvSpPr>
+            <a:spLocks noGrp="1"/>
+          </p:cNvSpPr>
+          <p:nvPr>
+            <p:ph type="title"/>
+          </p:nvPr>
+        </p:nvSpPr>
+        <p:spPr/>
+        <p:txBody>
+          <a:bodyPr/>
+          <a:lstStyle/>
+          <a:p>
+            <a:endParaRPr lang="en-GB"/>
+          </a:p>
+        </p:txBody>
+      </p:sp>
+      <p:sp>
+        <p:nvSpPr>
+          <p:cNvPr id="3" name="Content Placeholder 2">
+            <a:extLst>
+              <a:ext uri="{FF2B5EF4-FFF2-40B4-BE49-F238E27FC236}">
+                <a16:creationId xmlns:a16="http://schemas.microsoft.com/office/drawing/2014/main" id="{AD330B29-B54E-4CDA-9828-F4BD50BD0FA8}"/>
+              </a:ext>
+            </a:extLst>
+          </p:cNvPr>
+          <p:cNvSpPr>
+            <a:spLocks noGrp="1"/>
+          </p:cNvSpPr>
+          <p:nvPr>
+            <p:ph idx="1"/>
+          </p:nvPr>
+        </p:nvSpPr>
+        <p:spPr/>
+        <p:txBody>
+          <a:bodyPr/>
+          <a:lstStyle/>
+          <a:p>
+            <a:endParaRPr lang="en-GB"/>
+          </a:p>
+        </p:txBody>
+      </p:sp>
+      <p:pic>
+        <p:nvPicPr>
+          <p:cNvPr id="5" name="Picture 4">
+            <a:extLst>
+              <a:ext uri="{FF2B5EF4-FFF2-40B4-BE49-F238E27FC236}">
+                <a16:creationId xmlns:a16="http://schemas.microsoft.com/office/drawing/2014/main" id="{F9EDF2F1-6337-4BB2-A28E-DBBF01AAAEAB}"/>
+              </a:ext>
+            </a:extLst>
+          </p:cNvPr>
+          <p:cNvPicPr>
+            <a:picLocks noChangeAspect="1"/>
+          </p:cNvPicPr>
+          <p:nvPr/>
+        </p:nvPicPr>
+        <p:blipFill>
+          <a:blip r:embed="rId2"/>
+          <a:stretch>
+            <a:fillRect/>
+          </a:stretch>
+        </p:blipFill>
+        <p:spPr>
+          <a:xfrm>
+            <a:off x="0" y="0"/>
+            <a:ext cx="12192000" cy="6858000"/>
+          </a:xfrm>
+          <a:prstGeom prst="rect">
+            <a:avLst/>
+          </a:prstGeom>
+        </p:spPr>
+      </p:pic>
+    </p:spTree>
+    <p:extLst>
+      <p:ext uri="{BB962C8B-B14F-4D97-AF65-F5344CB8AC3E}">
+        <p14:creationId xmlns:p14="http://schemas.microsoft.com/office/powerpoint/2010/main" val="3685267133"/>
+      </p:ext>
+    </p:extLst>
+  </p:cSld>
+  <p:clrMapOvr>
+    <a:masterClrMapping/>
+  </p:clrMapOvr>
+</p:sld>
+</file>
+
+<file path=ppt/slides/slide6.xml><?xml version="1.0" encoding="utf-8"?>
+<p:sld xmlns:a="http://schemas.openxmlformats.org/drawingml/2006/main" xmlns:r="http://schemas.openxmlformats.org/officeDocument/2006/relationships" xmlns:p="http://schemas.openxmlformats.org/presentationml/2006/main">
+  <p:cSld>
+    <p:spTree>
+      <p:nvGrpSpPr>
+        <p:cNvPr id="1" name=""/>
+        <p:cNvGrpSpPr/>
+        <p:nvPr/>
+      </p:nvGrpSpPr>
+      <p:grpSpPr>
+        <a:xfrm>
+          <a:off x="0" y="0"/>
+          <a:ext cx="0" cy="0"/>
+          <a:chOff x="0" y="0"/>
+          <a:chExt cx="0" cy="0"/>
+        </a:xfrm>
+      </p:grpSpPr>
+      <p:sp>
+        <p:nvSpPr>
+          <p:cNvPr id="2" name="Title 1">
+            <a:extLst>
+              <a:ext uri="{FF2B5EF4-FFF2-40B4-BE49-F238E27FC236}">
+                <a16:creationId xmlns:a16="http://schemas.microsoft.com/office/drawing/2014/main" id="{876667D9-3C6F-4343-9A8B-0DA75B04E2DF}"/>
+              </a:ext>
+            </a:extLst>
+          </p:cNvPr>
+          <p:cNvSpPr>
+            <a:spLocks noGrp="1"/>
+          </p:cNvSpPr>
+          <p:nvPr>
+            <p:ph type="title"/>
+          </p:nvPr>
+        </p:nvSpPr>
+        <p:spPr/>
+        <p:txBody>
+          <a:bodyPr/>
+          <a:lstStyle/>
+          <a:p>
+            <a:endParaRPr lang="en-GB"/>
+          </a:p>
+        </p:txBody>
+      </p:sp>
+      <p:sp>
+        <p:nvSpPr>
+          <p:cNvPr id="3" name="Content Placeholder 2">
+            <a:extLst>
+              <a:ext uri="{FF2B5EF4-FFF2-40B4-BE49-F238E27FC236}">
+                <a16:creationId xmlns:a16="http://schemas.microsoft.com/office/drawing/2014/main" id="{075D6247-4A76-4FEE-8D6E-339902225EDF}"/>
+              </a:ext>
+            </a:extLst>
+          </p:cNvPr>
+          <p:cNvSpPr>
+            <a:spLocks noGrp="1"/>
+          </p:cNvSpPr>
+          <p:nvPr>
+            <p:ph idx="1"/>
+          </p:nvPr>
+        </p:nvSpPr>
+        <p:spPr/>
+        <p:txBody>
+          <a:bodyPr/>
+          <a:lstStyle/>
+          <a:p>
+            <a:endParaRPr lang="en-GB"/>
+          </a:p>
+        </p:txBody>
+      </p:sp>
+      <p:pic>
+        <p:nvPicPr>
+          <p:cNvPr id="5" name="Picture 4">
+            <a:extLst>
+              <a:ext uri="{FF2B5EF4-FFF2-40B4-BE49-F238E27FC236}">
+                <a16:creationId xmlns:a16="http://schemas.microsoft.com/office/drawing/2014/main" id="{E5C721E6-E2FA-4136-9617-4598CA6D2A3F}"/>
+              </a:ext>
+            </a:extLst>
+          </p:cNvPr>
+          <p:cNvPicPr>
+            <a:picLocks noChangeAspect="1"/>
+          </p:cNvPicPr>
+          <p:nvPr/>
+        </p:nvPicPr>
+        <p:blipFill>
+          <a:blip r:embed="rId2"/>
+          <a:stretch>
+            <a:fillRect/>
+          </a:stretch>
+        </p:blipFill>
+        <p:spPr>
+          <a:xfrm>
+            <a:off x="0" y="0"/>
+            <a:ext cx="12192000" cy="6858000"/>
+          </a:xfrm>
+          <a:prstGeom prst="rect">
+            <a:avLst/>
+          </a:prstGeom>
+        </p:spPr>
+      </p:pic>
+      <p:pic>
+        <p:nvPicPr>
+          <p:cNvPr id="7" name="Picture 6">
+            <a:extLst>
+              <a:ext uri="{FF2B5EF4-FFF2-40B4-BE49-F238E27FC236}">
+                <a16:creationId xmlns:a16="http://schemas.microsoft.com/office/drawing/2014/main" id="{9D777EB9-B38B-4AFE-A893-FDEAA1F9CE52}"/>
+              </a:ext>
+            </a:extLst>
+          </p:cNvPr>
+          <p:cNvPicPr>
+            <a:picLocks noChangeAspect="1"/>
+          </p:cNvPicPr>
+          <p:nvPr/>
+        </p:nvPicPr>
+        <p:blipFill>
+          <a:blip r:embed="rId3"/>
+          <a:stretch>
+            <a:fillRect/>
+          </a:stretch>
+        </p:blipFill>
+        <p:spPr>
+          <a:xfrm>
+            <a:off x="0" y="0"/>
+            <a:ext cx="12192000" cy="6858000"/>
+          </a:xfrm>
+          <a:prstGeom prst="rect">
+            <a:avLst/>
+          </a:prstGeom>
+        </p:spPr>
+      </p:pic>
+    </p:spTree>
+    <p:extLst>
+      <p:ext uri="{BB962C8B-B14F-4D97-AF65-F5344CB8AC3E}">
+        <p14:creationId xmlns:p14="http://schemas.microsoft.com/office/powerpoint/2010/main" val="1656254675"/>
+      </p:ext>
+    </p:extLst>
+  </p:cSld>
+  <p:clrMapOvr>
+    <a:masterClrMapping/>
+  </p:clrMapOvr>
+</p:sld>
+</file>
+
 <file path=ppt/theme/theme1.xml><?xml version="1.0" encoding="utf-8"?>
 <a:theme xmlns:a="http://schemas.openxmlformats.org/drawingml/2006/main" name="Office Theme">
   <a:themeElements>

</xml_diff>

<commit_message>
Started bootstrap and currently completing bootstrap project to go to javascript.
</commit_message>
<xml_diff>
--- a/TheWebDeveloperBootcamp2022/crucialImportantGoodToKnowTopics.docx.pptx
+++ b/TheWebDeveloperBootcamp2022/crucialImportantGoodToKnowTopics.docx.pptx
@@ -11,6 +11,8 @@
     <p:sldId id="259" r:id="rId5"/>
     <p:sldId id="260" r:id="rId6"/>
     <p:sldId id="261" r:id="rId7"/>
+    <p:sldId id="262" r:id="rId8"/>
+    <p:sldId id="263" r:id="rId9"/>
   </p:sldIdLst>
   <p:sldSz cx="12192000" cy="6858000"/>
   <p:notesSz cx="6858000" cy="9144000"/>
@@ -266,7 +268,7 @@
           <a:p>
             <a:fld id="{74A9CC92-CEC6-4267-ACE7-2A54D9A3B516}" type="datetimeFigureOut">
               <a:rPr lang="en-GB" smtClean="0"/>
-              <a:t>16/01/2022</a:t>
+              <a:t>22/01/2022</a:t>
             </a:fld>
             <a:endParaRPr lang="en-GB"/>
           </a:p>
@@ -466,7 +468,7 @@
           <a:p>
             <a:fld id="{74A9CC92-CEC6-4267-ACE7-2A54D9A3B516}" type="datetimeFigureOut">
               <a:rPr lang="en-GB" smtClean="0"/>
-              <a:t>16/01/2022</a:t>
+              <a:t>22/01/2022</a:t>
             </a:fld>
             <a:endParaRPr lang="en-GB"/>
           </a:p>
@@ -676,7 +678,7 @@
           <a:p>
             <a:fld id="{74A9CC92-CEC6-4267-ACE7-2A54D9A3B516}" type="datetimeFigureOut">
               <a:rPr lang="en-GB" smtClean="0"/>
-              <a:t>16/01/2022</a:t>
+              <a:t>22/01/2022</a:t>
             </a:fld>
             <a:endParaRPr lang="en-GB"/>
           </a:p>
@@ -876,7 +878,7 @@
           <a:p>
             <a:fld id="{74A9CC92-CEC6-4267-ACE7-2A54D9A3B516}" type="datetimeFigureOut">
               <a:rPr lang="en-GB" smtClean="0"/>
-              <a:t>16/01/2022</a:t>
+              <a:t>22/01/2022</a:t>
             </a:fld>
             <a:endParaRPr lang="en-GB"/>
           </a:p>
@@ -1152,7 +1154,7 @@
           <a:p>
             <a:fld id="{74A9CC92-CEC6-4267-ACE7-2A54D9A3B516}" type="datetimeFigureOut">
               <a:rPr lang="en-GB" smtClean="0"/>
-              <a:t>16/01/2022</a:t>
+              <a:t>22/01/2022</a:t>
             </a:fld>
             <a:endParaRPr lang="en-GB"/>
           </a:p>
@@ -1420,7 +1422,7 @@
           <a:p>
             <a:fld id="{74A9CC92-CEC6-4267-ACE7-2A54D9A3B516}" type="datetimeFigureOut">
               <a:rPr lang="en-GB" smtClean="0"/>
-              <a:t>16/01/2022</a:t>
+              <a:t>22/01/2022</a:t>
             </a:fld>
             <a:endParaRPr lang="en-GB"/>
           </a:p>
@@ -1835,7 +1837,7 @@
           <a:p>
             <a:fld id="{74A9CC92-CEC6-4267-ACE7-2A54D9A3B516}" type="datetimeFigureOut">
               <a:rPr lang="en-GB" smtClean="0"/>
-              <a:t>16/01/2022</a:t>
+              <a:t>22/01/2022</a:t>
             </a:fld>
             <a:endParaRPr lang="en-GB"/>
           </a:p>
@@ -1977,7 +1979,7 @@
           <a:p>
             <a:fld id="{74A9CC92-CEC6-4267-ACE7-2A54D9A3B516}" type="datetimeFigureOut">
               <a:rPr lang="en-GB" smtClean="0"/>
-              <a:t>16/01/2022</a:t>
+              <a:t>22/01/2022</a:t>
             </a:fld>
             <a:endParaRPr lang="en-GB"/>
           </a:p>
@@ -2090,7 +2092,7 @@
           <a:p>
             <a:fld id="{74A9CC92-CEC6-4267-ACE7-2A54D9A3B516}" type="datetimeFigureOut">
               <a:rPr lang="en-GB" smtClean="0"/>
-              <a:t>16/01/2022</a:t>
+              <a:t>22/01/2022</a:t>
             </a:fld>
             <a:endParaRPr lang="en-GB"/>
           </a:p>
@@ -2403,7 +2405,7 @@
           <a:p>
             <a:fld id="{74A9CC92-CEC6-4267-ACE7-2A54D9A3B516}" type="datetimeFigureOut">
               <a:rPr lang="en-GB" smtClean="0"/>
-              <a:t>16/01/2022</a:t>
+              <a:t>22/01/2022</a:t>
             </a:fld>
             <a:endParaRPr lang="en-GB"/>
           </a:p>
@@ -2692,7 +2694,7 @@
           <a:p>
             <a:fld id="{74A9CC92-CEC6-4267-ACE7-2A54D9A3B516}" type="datetimeFigureOut">
               <a:rPr lang="en-GB" smtClean="0"/>
-              <a:t>16/01/2022</a:t>
+              <a:t>22/01/2022</a:t>
             </a:fld>
             <a:endParaRPr lang="en-GB"/>
           </a:p>
@@ -2935,7 +2937,7 @@
           <a:p>
             <a:fld id="{74A9CC92-CEC6-4267-ACE7-2A54D9A3B516}" type="datetimeFigureOut">
               <a:rPr lang="en-GB" smtClean="0"/>
-              <a:t>16/01/2022</a:t>
+              <a:t>22/01/2022</a:t>
             </a:fld>
             <a:endParaRPr lang="en-GB"/>
           </a:p>
@@ -3982,6 +3984,226 @@
 </p:sld>
 </file>
 
+<file path=ppt/slides/slide7.xml><?xml version="1.0" encoding="utf-8"?>
+<p:sld xmlns:a="http://schemas.openxmlformats.org/drawingml/2006/main" xmlns:r="http://schemas.openxmlformats.org/officeDocument/2006/relationships" xmlns:p="http://schemas.openxmlformats.org/presentationml/2006/main">
+  <p:cSld>
+    <p:spTree>
+      <p:nvGrpSpPr>
+        <p:cNvPr id="1" name=""/>
+        <p:cNvGrpSpPr/>
+        <p:nvPr/>
+      </p:nvGrpSpPr>
+      <p:grpSpPr>
+        <a:xfrm>
+          <a:off x="0" y="0"/>
+          <a:ext cx="0" cy="0"/>
+          <a:chOff x="0" y="0"/>
+          <a:chExt cx="0" cy="0"/>
+        </a:xfrm>
+      </p:grpSpPr>
+      <p:sp>
+        <p:nvSpPr>
+          <p:cNvPr id="2" name="Title 1">
+            <a:extLst>
+              <a:ext uri="{FF2B5EF4-FFF2-40B4-BE49-F238E27FC236}">
+                <a16:creationId xmlns:a16="http://schemas.microsoft.com/office/drawing/2014/main" id="{45DFA9A1-C996-4B98-8A31-05E5EF3135A3}"/>
+              </a:ext>
+            </a:extLst>
+          </p:cNvPr>
+          <p:cNvSpPr>
+            <a:spLocks noGrp="1"/>
+          </p:cNvSpPr>
+          <p:nvPr>
+            <p:ph type="title"/>
+          </p:nvPr>
+        </p:nvSpPr>
+        <p:spPr/>
+        <p:txBody>
+          <a:bodyPr/>
+          <a:lstStyle/>
+          <a:p>
+            <a:endParaRPr lang="en-GB"/>
+          </a:p>
+        </p:txBody>
+      </p:sp>
+      <p:sp>
+        <p:nvSpPr>
+          <p:cNvPr id="3" name="Content Placeholder 2">
+            <a:extLst>
+              <a:ext uri="{FF2B5EF4-FFF2-40B4-BE49-F238E27FC236}">
+                <a16:creationId xmlns:a16="http://schemas.microsoft.com/office/drawing/2014/main" id="{4AEE7031-080E-4608-B058-AAFAC4EDA696}"/>
+              </a:ext>
+            </a:extLst>
+          </p:cNvPr>
+          <p:cNvSpPr>
+            <a:spLocks noGrp="1"/>
+          </p:cNvSpPr>
+          <p:nvPr>
+            <p:ph idx="1"/>
+          </p:nvPr>
+        </p:nvSpPr>
+        <p:spPr/>
+        <p:txBody>
+          <a:bodyPr/>
+          <a:lstStyle/>
+          <a:p>
+            <a:endParaRPr lang="en-GB"/>
+          </a:p>
+        </p:txBody>
+      </p:sp>
+      <p:pic>
+        <p:nvPicPr>
+          <p:cNvPr id="5" name="Picture 4">
+            <a:extLst>
+              <a:ext uri="{FF2B5EF4-FFF2-40B4-BE49-F238E27FC236}">
+                <a16:creationId xmlns:a16="http://schemas.microsoft.com/office/drawing/2014/main" id="{176BEA58-6838-4C45-9B6D-F7495612D746}"/>
+              </a:ext>
+            </a:extLst>
+          </p:cNvPr>
+          <p:cNvPicPr>
+            <a:picLocks noChangeAspect="1"/>
+          </p:cNvPicPr>
+          <p:nvPr/>
+        </p:nvPicPr>
+        <p:blipFill>
+          <a:blip r:embed="rId2"/>
+          <a:stretch>
+            <a:fillRect/>
+          </a:stretch>
+        </p:blipFill>
+        <p:spPr>
+          <a:xfrm>
+            <a:off x="0" y="0"/>
+            <a:ext cx="12192000" cy="6858000"/>
+          </a:xfrm>
+          <a:prstGeom prst="rect">
+            <a:avLst/>
+          </a:prstGeom>
+        </p:spPr>
+      </p:pic>
+    </p:spTree>
+    <p:extLst>
+      <p:ext uri="{BB962C8B-B14F-4D97-AF65-F5344CB8AC3E}">
+        <p14:creationId xmlns:p14="http://schemas.microsoft.com/office/powerpoint/2010/main" val="1715954760"/>
+      </p:ext>
+    </p:extLst>
+  </p:cSld>
+  <p:clrMapOvr>
+    <a:masterClrMapping/>
+  </p:clrMapOvr>
+</p:sld>
+</file>
+
+<file path=ppt/slides/slide8.xml><?xml version="1.0" encoding="utf-8"?>
+<p:sld xmlns:a="http://schemas.openxmlformats.org/drawingml/2006/main" xmlns:r="http://schemas.openxmlformats.org/officeDocument/2006/relationships" xmlns:p="http://schemas.openxmlformats.org/presentationml/2006/main">
+  <p:cSld>
+    <p:spTree>
+      <p:nvGrpSpPr>
+        <p:cNvPr id="1" name=""/>
+        <p:cNvGrpSpPr/>
+        <p:nvPr/>
+      </p:nvGrpSpPr>
+      <p:grpSpPr>
+        <a:xfrm>
+          <a:off x="0" y="0"/>
+          <a:ext cx="0" cy="0"/>
+          <a:chOff x="0" y="0"/>
+          <a:chExt cx="0" cy="0"/>
+        </a:xfrm>
+      </p:grpSpPr>
+      <p:sp>
+        <p:nvSpPr>
+          <p:cNvPr id="2" name="Title 1">
+            <a:extLst>
+              <a:ext uri="{FF2B5EF4-FFF2-40B4-BE49-F238E27FC236}">
+                <a16:creationId xmlns:a16="http://schemas.microsoft.com/office/drawing/2014/main" id="{3C4430C6-1D01-4F88-8533-2B97CF013D54}"/>
+              </a:ext>
+            </a:extLst>
+          </p:cNvPr>
+          <p:cNvSpPr>
+            <a:spLocks noGrp="1"/>
+          </p:cNvSpPr>
+          <p:nvPr>
+            <p:ph type="title"/>
+          </p:nvPr>
+        </p:nvSpPr>
+        <p:spPr/>
+        <p:txBody>
+          <a:bodyPr/>
+          <a:lstStyle/>
+          <a:p>
+            <a:endParaRPr lang="en-GB"/>
+          </a:p>
+        </p:txBody>
+      </p:sp>
+      <p:sp>
+        <p:nvSpPr>
+          <p:cNvPr id="3" name="Content Placeholder 2">
+            <a:extLst>
+              <a:ext uri="{FF2B5EF4-FFF2-40B4-BE49-F238E27FC236}">
+                <a16:creationId xmlns:a16="http://schemas.microsoft.com/office/drawing/2014/main" id="{BB7B1BE1-776E-41D4-AEF2-56641FD3C3BD}"/>
+              </a:ext>
+            </a:extLst>
+          </p:cNvPr>
+          <p:cNvSpPr>
+            <a:spLocks noGrp="1"/>
+          </p:cNvSpPr>
+          <p:nvPr>
+            <p:ph idx="1"/>
+          </p:nvPr>
+        </p:nvSpPr>
+        <p:spPr/>
+        <p:txBody>
+          <a:bodyPr/>
+          <a:lstStyle/>
+          <a:p>
+            <a:endParaRPr lang="en-GB"/>
+          </a:p>
+        </p:txBody>
+      </p:sp>
+      <p:pic>
+        <p:nvPicPr>
+          <p:cNvPr id="5" name="Picture 4">
+            <a:extLst>
+              <a:ext uri="{FF2B5EF4-FFF2-40B4-BE49-F238E27FC236}">
+                <a16:creationId xmlns:a16="http://schemas.microsoft.com/office/drawing/2014/main" id="{78B280AA-9AF5-4A74-A5FC-21E368BCE830}"/>
+              </a:ext>
+            </a:extLst>
+          </p:cNvPr>
+          <p:cNvPicPr>
+            <a:picLocks noChangeAspect="1"/>
+          </p:cNvPicPr>
+          <p:nvPr/>
+        </p:nvPicPr>
+        <p:blipFill>
+          <a:blip r:embed="rId2"/>
+          <a:stretch>
+            <a:fillRect/>
+          </a:stretch>
+        </p:blipFill>
+        <p:spPr>
+          <a:xfrm>
+            <a:off x="0" y="0"/>
+            <a:ext cx="12192000" cy="6858000"/>
+          </a:xfrm>
+          <a:prstGeom prst="rect">
+            <a:avLst/>
+          </a:prstGeom>
+        </p:spPr>
+      </p:pic>
+    </p:spTree>
+    <p:extLst>
+      <p:ext uri="{BB962C8B-B14F-4D97-AF65-F5344CB8AC3E}">
+        <p14:creationId xmlns:p14="http://schemas.microsoft.com/office/powerpoint/2010/main" val="1676440412"/>
+      </p:ext>
+    </p:extLst>
+  </p:cSld>
+  <p:clrMapOvr>
+    <a:masterClrMapping/>
+  </p:clrMapOvr>
+</p:sld>
+</file>
+
 <file path=ppt/theme/theme1.xml><?xml version="1.0" encoding="utf-8"?>
 <a:theme xmlns:a="http://schemas.openxmlformats.org/drawingml/2006/main" name="Office Theme">
   <a:themeElements>

</xml_diff>

<commit_message>
Completed up to API request
</commit_message>
<xml_diff>
--- a/TheWebDeveloperBootcamp2022/crucialImportantGoodToKnowTopics.docx.pptx
+++ b/TheWebDeveloperBootcamp2022/crucialImportantGoodToKnowTopics.docx.pptx
@@ -13,6 +13,8 @@
     <p:sldId id="261" r:id="rId7"/>
     <p:sldId id="262" r:id="rId8"/>
     <p:sldId id="263" r:id="rId9"/>
+    <p:sldId id="264" r:id="rId10"/>
+    <p:sldId id="265" r:id="rId11"/>
   </p:sldIdLst>
   <p:sldSz cx="12192000" cy="6858000"/>
   <p:notesSz cx="6858000" cy="9144000"/>
@@ -268,7 +270,7 @@
           <a:p>
             <a:fld id="{74A9CC92-CEC6-4267-ACE7-2A54D9A3B516}" type="datetimeFigureOut">
               <a:rPr lang="en-GB" smtClean="0"/>
-              <a:t>22/01/2022</a:t>
+              <a:t>24/01/2022</a:t>
             </a:fld>
             <a:endParaRPr lang="en-GB"/>
           </a:p>
@@ -468,7 +470,7 @@
           <a:p>
             <a:fld id="{74A9CC92-CEC6-4267-ACE7-2A54D9A3B516}" type="datetimeFigureOut">
               <a:rPr lang="en-GB" smtClean="0"/>
-              <a:t>22/01/2022</a:t>
+              <a:t>24/01/2022</a:t>
             </a:fld>
             <a:endParaRPr lang="en-GB"/>
           </a:p>
@@ -678,7 +680,7 @@
           <a:p>
             <a:fld id="{74A9CC92-CEC6-4267-ACE7-2A54D9A3B516}" type="datetimeFigureOut">
               <a:rPr lang="en-GB" smtClean="0"/>
-              <a:t>22/01/2022</a:t>
+              <a:t>24/01/2022</a:t>
             </a:fld>
             <a:endParaRPr lang="en-GB"/>
           </a:p>
@@ -878,7 +880,7 @@
           <a:p>
             <a:fld id="{74A9CC92-CEC6-4267-ACE7-2A54D9A3B516}" type="datetimeFigureOut">
               <a:rPr lang="en-GB" smtClean="0"/>
-              <a:t>22/01/2022</a:t>
+              <a:t>24/01/2022</a:t>
             </a:fld>
             <a:endParaRPr lang="en-GB"/>
           </a:p>
@@ -1154,7 +1156,7 @@
           <a:p>
             <a:fld id="{74A9CC92-CEC6-4267-ACE7-2A54D9A3B516}" type="datetimeFigureOut">
               <a:rPr lang="en-GB" smtClean="0"/>
-              <a:t>22/01/2022</a:t>
+              <a:t>24/01/2022</a:t>
             </a:fld>
             <a:endParaRPr lang="en-GB"/>
           </a:p>
@@ -1422,7 +1424,7 @@
           <a:p>
             <a:fld id="{74A9CC92-CEC6-4267-ACE7-2A54D9A3B516}" type="datetimeFigureOut">
               <a:rPr lang="en-GB" smtClean="0"/>
-              <a:t>22/01/2022</a:t>
+              <a:t>24/01/2022</a:t>
             </a:fld>
             <a:endParaRPr lang="en-GB"/>
           </a:p>
@@ -1837,7 +1839,7 @@
           <a:p>
             <a:fld id="{74A9CC92-CEC6-4267-ACE7-2A54D9A3B516}" type="datetimeFigureOut">
               <a:rPr lang="en-GB" smtClean="0"/>
-              <a:t>22/01/2022</a:t>
+              <a:t>24/01/2022</a:t>
             </a:fld>
             <a:endParaRPr lang="en-GB"/>
           </a:p>
@@ -1979,7 +1981,7 @@
           <a:p>
             <a:fld id="{74A9CC92-CEC6-4267-ACE7-2A54D9A3B516}" type="datetimeFigureOut">
               <a:rPr lang="en-GB" smtClean="0"/>
-              <a:t>22/01/2022</a:t>
+              <a:t>24/01/2022</a:t>
             </a:fld>
             <a:endParaRPr lang="en-GB"/>
           </a:p>
@@ -2092,7 +2094,7 @@
           <a:p>
             <a:fld id="{74A9CC92-CEC6-4267-ACE7-2A54D9A3B516}" type="datetimeFigureOut">
               <a:rPr lang="en-GB" smtClean="0"/>
-              <a:t>22/01/2022</a:t>
+              <a:t>24/01/2022</a:t>
             </a:fld>
             <a:endParaRPr lang="en-GB"/>
           </a:p>
@@ -2405,7 +2407,7 @@
           <a:p>
             <a:fld id="{74A9CC92-CEC6-4267-ACE7-2A54D9A3B516}" type="datetimeFigureOut">
               <a:rPr lang="en-GB" smtClean="0"/>
-              <a:t>22/01/2022</a:t>
+              <a:t>24/01/2022</a:t>
             </a:fld>
             <a:endParaRPr lang="en-GB"/>
           </a:p>
@@ -2694,7 +2696,7 @@
           <a:p>
             <a:fld id="{74A9CC92-CEC6-4267-ACE7-2A54D9A3B516}" type="datetimeFigureOut">
               <a:rPr lang="en-GB" smtClean="0"/>
-              <a:t>22/01/2022</a:t>
+              <a:t>24/01/2022</a:t>
             </a:fld>
             <a:endParaRPr lang="en-GB"/>
           </a:p>
@@ -2937,7 +2939,7 @@
           <a:p>
             <a:fld id="{74A9CC92-CEC6-4267-ACE7-2A54D9A3B516}" type="datetimeFigureOut">
               <a:rPr lang="en-GB" smtClean="0"/>
-              <a:t>22/01/2022</a:t>
+              <a:t>24/01/2022</a:t>
             </a:fld>
             <a:endParaRPr lang="en-GB"/>
           </a:p>
@@ -3404,6 +3406,116 @@
 </p:sld>
 </file>
 
+<file path=ppt/slides/slide10.xml><?xml version="1.0" encoding="utf-8"?>
+<p:sld xmlns:a="http://schemas.openxmlformats.org/drawingml/2006/main" xmlns:r="http://schemas.openxmlformats.org/officeDocument/2006/relationships" xmlns:p="http://schemas.openxmlformats.org/presentationml/2006/main">
+  <p:cSld>
+    <p:spTree>
+      <p:nvGrpSpPr>
+        <p:cNvPr id="1" name=""/>
+        <p:cNvGrpSpPr/>
+        <p:nvPr/>
+      </p:nvGrpSpPr>
+      <p:grpSpPr>
+        <a:xfrm>
+          <a:off x="0" y="0"/>
+          <a:ext cx="0" cy="0"/>
+          <a:chOff x="0" y="0"/>
+          <a:chExt cx="0" cy="0"/>
+        </a:xfrm>
+      </p:grpSpPr>
+      <p:sp>
+        <p:nvSpPr>
+          <p:cNvPr id="2" name="Title 1">
+            <a:extLst>
+              <a:ext uri="{FF2B5EF4-FFF2-40B4-BE49-F238E27FC236}">
+                <a16:creationId xmlns:a16="http://schemas.microsoft.com/office/drawing/2014/main" id="{DD6F0C4E-1964-4375-8BFD-A8F8A6F23E8A}"/>
+              </a:ext>
+            </a:extLst>
+          </p:cNvPr>
+          <p:cNvSpPr>
+            <a:spLocks noGrp="1"/>
+          </p:cNvSpPr>
+          <p:nvPr>
+            <p:ph type="title"/>
+          </p:nvPr>
+        </p:nvSpPr>
+        <p:spPr/>
+        <p:txBody>
+          <a:bodyPr/>
+          <a:lstStyle/>
+          <a:p>
+            <a:endParaRPr lang="en-GB"/>
+          </a:p>
+        </p:txBody>
+      </p:sp>
+      <p:sp>
+        <p:nvSpPr>
+          <p:cNvPr id="3" name="Content Placeholder 2">
+            <a:extLst>
+              <a:ext uri="{FF2B5EF4-FFF2-40B4-BE49-F238E27FC236}">
+                <a16:creationId xmlns:a16="http://schemas.microsoft.com/office/drawing/2014/main" id="{45300088-D8F8-4C79-8EC5-765B52E0F067}"/>
+              </a:ext>
+            </a:extLst>
+          </p:cNvPr>
+          <p:cNvSpPr>
+            <a:spLocks noGrp="1"/>
+          </p:cNvSpPr>
+          <p:nvPr>
+            <p:ph idx="1"/>
+          </p:nvPr>
+        </p:nvSpPr>
+        <p:spPr/>
+        <p:txBody>
+          <a:bodyPr/>
+          <a:lstStyle/>
+          <a:p>
+            <a:endParaRPr lang="en-GB"/>
+          </a:p>
+        </p:txBody>
+      </p:sp>
+      <p:pic>
+        <p:nvPicPr>
+          <p:cNvPr id="5" name="Picture 4">
+            <a:extLst>
+              <a:ext uri="{FF2B5EF4-FFF2-40B4-BE49-F238E27FC236}">
+                <a16:creationId xmlns:a16="http://schemas.microsoft.com/office/drawing/2014/main" id="{494A9AE2-0294-4196-8A4D-291B49A0D707}"/>
+              </a:ext>
+            </a:extLst>
+          </p:cNvPr>
+          <p:cNvPicPr>
+            <a:picLocks noChangeAspect="1"/>
+          </p:cNvPicPr>
+          <p:nvPr/>
+        </p:nvPicPr>
+        <p:blipFill>
+          <a:blip r:embed="rId2"/>
+          <a:stretch>
+            <a:fillRect/>
+          </a:stretch>
+        </p:blipFill>
+        <p:spPr>
+          <a:xfrm>
+            <a:off x="0" y="0"/>
+            <a:ext cx="12192000" cy="6858000"/>
+          </a:xfrm>
+          <a:prstGeom prst="rect">
+            <a:avLst/>
+          </a:prstGeom>
+        </p:spPr>
+      </p:pic>
+    </p:spTree>
+    <p:extLst>
+      <p:ext uri="{BB962C8B-B14F-4D97-AF65-F5344CB8AC3E}">
+        <p14:creationId xmlns:p14="http://schemas.microsoft.com/office/powerpoint/2010/main" val="3869783234"/>
+      </p:ext>
+    </p:extLst>
+  </p:cSld>
+  <p:clrMapOvr>
+    <a:masterClrMapping/>
+  </p:clrMapOvr>
+</p:sld>
+</file>
+
 <file path=ppt/slides/slide2.xml><?xml version="1.0" encoding="utf-8"?>
 <p:sld xmlns:a="http://schemas.openxmlformats.org/drawingml/2006/main" xmlns:r="http://schemas.openxmlformats.org/officeDocument/2006/relationships" xmlns:p="http://schemas.openxmlformats.org/presentationml/2006/main">
   <p:cSld>
@@ -4195,6 +4307,116 @@
     <p:extLst>
       <p:ext uri="{BB962C8B-B14F-4D97-AF65-F5344CB8AC3E}">
         <p14:creationId xmlns:p14="http://schemas.microsoft.com/office/powerpoint/2010/main" val="1676440412"/>
+      </p:ext>
+    </p:extLst>
+  </p:cSld>
+  <p:clrMapOvr>
+    <a:masterClrMapping/>
+  </p:clrMapOvr>
+</p:sld>
+</file>
+
+<file path=ppt/slides/slide9.xml><?xml version="1.0" encoding="utf-8"?>
+<p:sld xmlns:a="http://schemas.openxmlformats.org/drawingml/2006/main" xmlns:r="http://schemas.openxmlformats.org/officeDocument/2006/relationships" xmlns:p="http://schemas.openxmlformats.org/presentationml/2006/main">
+  <p:cSld>
+    <p:spTree>
+      <p:nvGrpSpPr>
+        <p:cNvPr id="1" name=""/>
+        <p:cNvGrpSpPr/>
+        <p:nvPr/>
+      </p:nvGrpSpPr>
+      <p:grpSpPr>
+        <a:xfrm>
+          <a:off x="0" y="0"/>
+          <a:ext cx="0" cy="0"/>
+          <a:chOff x="0" y="0"/>
+          <a:chExt cx="0" cy="0"/>
+        </a:xfrm>
+      </p:grpSpPr>
+      <p:sp>
+        <p:nvSpPr>
+          <p:cNvPr id="2" name="Title 1">
+            <a:extLst>
+              <a:ext uri="{FF2B5EF4-FFF2-40B4-BE49-F238E27FC236}">
+                <a16:creationId xmlns:a16="http://schemas.microsoft.com/office/drawing/2014/main" id="{7E98195C-8663-4207-89F3-8110053EE7C1}"/>
+              </a:ext>
+            </a:extLst>
+          </p:cNvPr>
+          <p:cNvSpPr>
+            <a:spLocks noGrp="1"/>
+          </p:cNvSpPr>
+          <p:nvPr>
+            <p:ph type="title"/>
+          </p:nvPr>
+        </p:nvSpPr>
+        <p:spPr/>
+        <p:txBody>
+          <a:bodyPr/>
+          <a:lstStyle/>
+          <a:p>
+            <a:endParaRPr lang="en-GB"/>
+          </a:p>
+        </p:txBody>
+      </p:sp>
+      <p:sp>
+        <p:nvSpPr>
+          <p:cNvPr id="3" name="Content Placeholder 2">
+            <a:extLst>
+              <a:ext uri="{FF2B5EF4-FFF2-40B4-BE49-F238E27FC236}">
+                <a16:creationId xmlns:a16="http://schemas.microsoft.com/office/drawing/2014/main" id="{4BAD6F9B-8823-4F32-89CA-F2FFAF6BEF5B}"/>
+              </a:ext>
+            </a:extLst>
+          </p:cNvPr>
+          <p:cNvSpPr>
+            <a:spLocks noGrp="1"/>
+          </p:cNvSpPr>
+          <p:nvPr>
+            <p:ph idx="1"/>
+          </p:nvPr>
+        </p:nvSpPr>
+        <p:spPr/>
+        <p:txBody>
+          <a:bodyPr/>
+          <a:lstStyle/>
+          <a:p>
+            <a:endParaRPr lang="en-GB"/>
+          </a:p>
+        </p:txBody>
+      </p:sp>
+      <p:pic>
+        <p:nvPicPr>
+          <p:cNvPr id="5" name="Picture 4">
+            <a:extLst>
+              <a:ext uri="{FF2B5EF4-FFF2-40B4-BE49-F238E27FC236}">
+                <a16:creationId xmlns:a16="http://schemas.microsoft.com/office/drawing/2014/main" id="{A88B84E4-BC5B-4AAF-90CE-015AE6445C6A}"/>
+              </a:ext>
+            </a:extLst>
+          </p:cNvPr>
+          <p:cNvPicPr>
+            <a:picLocks noChangeAspect="1"/>
+          </p:cNvPicPr>
+          <p:nvPr/>
+        </p:nvPicPr>
+        <p:blipFill>
+          <a:blip r:embed="rId2"/>
+          <a:stretch>
+            <a:fillRect/>
+          </a:stretch>
+        </p:blipFill>
+        <p:spPr>
+          <a:xfrm>
+            <a:off x="0" y="0"/>
+            <a:ext cx="12192000" cy="6858000"/>
+          </a:xfrm>
+          <a:prstGeom prst="rect">
+            <a:avLst/>
+          </a:prstGeom>
+        </p:spPr>
+      </p:pic>
+    </p:spTree>
+    <p:extLst>
+      <p:ext uri="{BB962C8B-B14F-4D97-AF65-F5344CB8AC3E}">
+        <p14:creationId xmlns:p14="http://schemas.microsoft.com/office/powerpoint/2010/main" val="4249251062"/>
       </p:ext>
     </p:extLst>
   </p:cSld>

</xml_diff>